<commit_message>
Updated deployment script and arch diagram
</commit_message>
<xml_diff>
--- a/Design/Architecture-Flow.pptx
+++ b/Design/Architecture-Flow.pptx
@@ -261,7 +261,7 @@
           <a:p>
             <a:fld id="{08A1FD4F-42F1-4B37-8CF1-F677897327D2}" type="datetimeFigureOut">
               <a:rPr lang="en-AU" smtClean="0"/>
-              <a:t>1/11/2021</a:t>
+              <a:t>24/11/2021</a:t>
             </a:fld>
             <a:endParaRPr lang="en-AU"/>
           </a:p>
@@ -461,7 +461,7 @@
           <a:p>
             <a:fld id="{08A1FD4F-42F1-4B37-8CF1-F677897327D2}" type="datetimeFigureOut">
               <a:rPr lang="en-AU" smtClean="0"/>
-              <a:t>1/11/2021</a:t>
+              <a:t>24/11/2021</a:t>
             </a:fld>
             <a:endParaRPr lang="en-AU"/>
           </a:p>
@@ -671,7 +671,7 @@
           <a:p>
             <a:fld id="{08A1FD4F-42F1-4B37-8CF1-F677897327D2}" type="datetimeFigureOut">
               <a:rPr lang="en-AU" smtClean="0"/>
-              <a:t>1/11/2021</a:t>
+              <a:t>24/11/2021</a:t>
             </a:fld>
             <a:endParaRPr lang="en-AU"/>
           </a:p>
@@ -871,7 +871,7 @@
           <a:p>
             <a:fld id="{08A1FD4F-42F1-4B37-8CF1-F677897327D2}" type="datetimeFigureOut">
               <a:rPr lang="en-AU" smtClean="0"/>
-              <a:t>1/11/2021</a:t>
+              <a:t>24/11/2021</a:t>
             </a:fld>
             <a:endParaRPr lang="en-AU"/>
           </a:p>
@@ -1147,7 +1147,7 @@
           <a:p>
             <a:fld id="{08A1FD4F-42F1-4B37-8CF1-F677897327D2}" type="datetimeFigureOut">
               <a:rPr lang="en-AU" smtClean="0"/>
-              <a:t>1/11/2021</a:t>
+              <a:t>24/11/2021</a:t>
             </a:fld>
             <a:endParaRPr lang="en-AU"/>
           </a:p>
@@ -1415,7 +1415,7 @@
           <a:p>
             <a:fld id="{08A1FD4F-42F1-4B37-8CF1-F677897327D2}" type="datetimeFigureOut">
               <a:rPr lang="en-AU" smtClean="0"/>
-              <a:t>1/11/2021</a:t>
+              <a:t>24/11/2021</a:t>
             </a:fld>
             <a:endParaRPr lang="en-AU"/>
           </a:p>
@@ -1830,7 +1830,7 @@
           <a:p>
             <a:fld id="{08A1FD4F-42F1-4B37-8CF1-F677897327D2}" type="datetimeFigureOut">
               <a:rPr lang="en-AU" smtClean="0"/>
-              <a:t>1/11/2021</a:t>
+              <a:t>24/11/2021</a:t>
             </a:fld>
             <a:endParaRPr lang="en-AU"/>
           </a:p>
@@ -1972,7 +1972,7 @@
           <a:p>
             <a:fld id="{08A1FD4F-42F1-4B37-8CF1-F677897327D2}" type="datetimeFigureOut">
               <a:rPr lang="en-AU" smtClean="0"/>
-              <a:t>1/11/2021</a:t>
+              <a:t>24/11/2021</a:t>
             </a:fld>
             <a:endParaRPr lang="en-AU"/>
           </a:p>
@@ -2085,7 +2085,7 @@
           <a:p>
             <a:fld id="{08A1FD4F-42F1-4B37-8CF1-F677897327D2}" type="datetimeFigureOut">
               <a:rPr lang="en-AU" smtClean="0"/>
-              <a:t>1/11/2021</a:t>
+              <a:t>24/11/2021</a:t>
             </a:fld>
             <a:endParaRPr lang="en-AU"/>
           </a:p>
@@ -2398,7 +2398,7 @@
           <a:p>
             <a:fld id="{08A1FD4F-42F1-4B37-8CF1-F677897327D2}" type="datetimeFigureOut">
               <a:rPr lang="en-AU" smtClean="0"/>
-              <a:t>1/11/2021</a:t>
+              <a:t>24/11/2021</a:t>
             </a:fld>
             <a:endParaRPr lang="en-AU"/>
           </a:p>
@@ -2687,7 +2687,7 @@
           <a:p>
             <a:fld id="{08A1FD4F-42F1-4B37-8CF1-F677897327D2}" type="datetimeFigureOut">
               <a:rPr lang="en-AU" smtClean="0"/>
-              <a:t>1/11/2021</a:t>
+              <a:t>24/11/2021</a:t>
             </a:fld>
             <a:endParaRPr lang="en-AU"/>
           </a:p>
@@ -2930,7 +2930,7 @@
           <a:p>
             <a:fld id="{08A1FD4F-42F1-4B37-8CF1-F677897327D2}" type="datetimeFigureOut">
               <a:rPr lang="en-AU" smtClean="0"/>
-              <a:t>1/11/2021</a:t>
+              <a:t>24/11/2021</a:t>
             </a:fld>
             <a:endParaRPr lang="en-AU"/>
           </a:p>
@@ -3361,8 +3361,8 @@
         </p:nvSpPr>
         <p:spPr>
           <a:xfrm>
-            <a:off x="2099136" y="1623510"/>
-            <a:ext cx="3492216" cy="832392"/>
+            <a:off x="1840654" y="3074244"/>
+            <a:ext cx="3492216" cy="673300"/>
           </a:xfrm>
           <a:prstGeom prst="downArrowCallout">
             <a:avLst/>
@@ -3389,7 +3389,7 @@
             <a:pPr algn="ctr"/>
             <a:r>
               <a:rPr lang="en-US" dirty="0"/>
-              <a:t>Message Queue</a:t>
+              <a:t>Message Queue / Webhook</a:t>
             </a:r>
             <a:endParaRPr lang="en-AU" dirty="0"/>
           </a:p>
@@ -3409,7 +3409,7 @@
         </p:nvSpPr>
         <p:spPr>
           <a:xfrm>
-            <a:off x="2099135" y="2455902"/>
+            <a:off x="1840653" y="3747544"/>
             <a:ext cx="3492217" cy="613016"/>
           </a:xfrm>
           <a:prstGeom prst="rect">
@@ -3483,7 +3483,7 @@
         </p:nvSpPr>
         <p:spPr>
           <a:xfrm>
-            <a:off x="808943" y="4573781"/>
+            <a:off x="550461" y="5865423"/>
             <a:ext cx="1518151" cy="670423"/>
           </a:xfrm>
           <a:prstGeom prst="trapezoid">
@@ -3541,7 +3541,7 @@
         </p:nvSpPr>
         <p:spPr>
           <a:xfrm>
-            <a:off x="4906768" y="4573781"/>
+            <a:off x="4648286" y="5865423"/>
             <a:ext cx="1518151" cy="670423"/>
           </a:xfrm>
           <a:prstGeom prst="trapezoid">
@@ -3595,7 +3595,7 @@
         </p:nvSpPr>
         <p:spPr>
           <a:xfrm>
-            <a:off x="2915960" y="4573781"/>
+            <a:off x="2657478" y="5865423"/>
             <a:ext cx="1518151" cy="670423"/>
           </a:xfrm>
           <a:prstGeom prst="trapezoid">
@@ -3653,7 +3653,7 @@
         </p:nvCxnSpPr>
         <p:spPr>
           <a:xfrm rot="5400000">
-            <a:off x="1954201" y="2682737"/>
+            <a:off x="1695719" y="3974379"/>
             <a:ext cx="1504863" cy="2277225"/>
           </a:xfrm>
           <a:prstGeom prst="bentConnector3">
@@ -3702,7 +3702,7 @@
         </p:nvCxnSpPr>
         <p:spPr>
           <a:xfrm rot="5400000">
-            <a:off x="3007709" y="3736245"/>
+            <a:off x="2749227" y="5027887"/>
             <a:ext cx="1504863" cy="170208"/>
           </a:xfrm>
           <a:prstGeom prst="bentConnector3">
@@ -3751,7 +3751,7 @@
         </p:nvCxnSpPr>
         <p:spPr>
           <a:xfrm rot="16200000" flipH="1">
-            <a:off x="4003113" y="2911049"/>
+            <a:off x="3744631" y="4202691"/>
             <a:ext cx="1504863" cy="1820600"/>
           </a:xfrm>
           <a:prstGeom prst="bentConnector3">
@@ -3852,7 +3852,7 @@
         </p:nvSpPr>
         <p:spPr>
           <a:xfrm>
-            <a:off x="7590614" y="2951818"/>
+            <a:off x="9634345" y="3335724"/>
             <a:ext cx="1226034" cy="935929"/>
           </a:xfrm>
           <a:prstGeom prst="flowChartMagneticDisk">
@@ -3978,14 +3978,14 @@
           <p:cNvCxnSpPr>
             <a:cxnSpLocks/>
             <a:stCxn id="22" idx="1"/>
-            <a:endCxn id="5" idx="3"/>
+            <a:endCxn id="30" idx="3"/>
           </p:cNvCxnSpPr>
           <p:nvPr/>
         </p:nvCxnSpPr>
         <p:spPr>
-          <a:xfrm rot="10800000">
-            <a:off x="5591353" y="1893942"/>
-            <a:ext cx="1427249" cy="184738"/>
+          <a:xfrm rot="10800000" flipV="1">
+            <a:off x="5332869" y="2078679"/>
+            <a:ext cx="1685732" cy="153659"/>
           </a:xfrm>
           <a:prstGeom prst="bentConnector3">
             <a:avLst/>
@@ -4080,9 +4080,9 @@
           <p:nvPr/>
         </p:nvCxnSpPr>
         <p:spPr>
-          <a:xfrm rot="5400000">
-            <a:off x="7963884" y="2712070"/>
-            <a:ext cx="479495" cy="12700"/>
+          <a:xfrm rot="16200000" flipH="1">
+            <a:off x="8793796" y="1882157"/>
+            <a:ext cx="863401" cy="2043731"/>
           </a:xfrm>
           <a:prstGeom prst="bentConnector3">
             <a:avLst/>
@@ -4126,11 +4126,16 @@
         </p:nvSpPr>
         <p:spPr>
           <a:xfrm>
-            <a:off x="7336919" y="5502801"/>
-            <a:ext cx="3862622" cy="935929"/>
+            <a:off x="8369758" y="5789802"/>
+            <a:ext cx="3071479" cy="746044"/>
           </a:xfrm>
           <a:prstGeom prst="upArrowCallout">
-            <a:avLst/>
+            <a:avLst>
+              <a:gd name="adj1" fmla="val 25000"/>
+              <a:gd name="adj2" fmla="val 25000"/>
+              <a:gd name="adj3" fmla="val 25000"/>
+              <a:gd name="adj4" fmla="val 47389"/>
+            </a:avLst>
           </a:prstGeom>
           <a:solidFill>
             <a:schemeClr val="accent3"/>
@@ -4159,18 +4164,18 @@
           <a:p>
             <a:pPr algn="ctr"/>
             <a:r>
-              <a:rPr lang="en-US" dirty="0"/>
+              <a:rPr lang="en-US" sz="1400" dirty="0"/>
               <a:t>Data </a:t>
             </a:r>
             <a:r>
-              <a:rPr lang="en-US" dirty="0" err="1"/>
+              <a:rPr lang="en-US" sz="1400" dirty="0" err="1"/>
               <a:t>Sanitiser</a:t>
             </a:r>
             <a:r>
-              <a:rPr lang="en-US" dirty="0"/>
+              <a:rPr lang="en-US" sz="1400" dirty="0"/>
               <a:t> service</a:t>
             </a:r>
-            <a:endParaRPr lang="en-AU" dirty="0"/>
+            <a:endParaRPr lang="en-AU" sz="1400" dirty="0"/>
           </a:p>
         </p:txBody>
       </p:sp>
@@ -4188,8 +4193,8 @@
         </p:nvSpPr>
         <p:spPr>
           <a:xfrm>
-            <a:off x="8816648" y="4613005"/>
-            <a:ext cx="930802" cy="820090"/>
+            <a:off x="9507207" y="5136096"/>
+            <a:ext cx="740155" cy="653706"/>
           </a:xfrm>
           <a:prstGeom prst="heptagon">
             <a:avLst/>
@@ -4217,10 +4222,10 @@
           <a:p>
             <a:pPr algn="ctr"/>
             <a:r>
-              <a:rPr lang="en-US" sz="1400" dirty="0"/>
+              <a:rPr lang="en-US" sz="1000" dirty="0"/>
               <a:t>Unused so far</a:t>
             </a:r>
-            <a:endParaRPr lang="en-AU" sz="1400" dirty="0"/>
+            <a:endParaRPr lang="en-AU" sz="1000" dirty="0"/>
           </a:p>
         </p:txBody>
       </p:sp>
@@ -4238,7 +4243,7 @@
         </p:nvSpPr>
         <p:spPr>
           <a:xfrm>
-            <a:off x="6304977" y="1709348"/>
+            <a:off x="6063392" y="1761867"/>
             <a:ext cx="557661" cy="369332"/>
           </a:xfrm>
           <a:prstGeom prst="rect">
@@ -4361,14 +4366,14 @@
           <p:cNvCxnSpPr>
             <a:cxnSpLocks/>
             <a:stCxn id="34" idx="2"/>
-            <a:endCxn id="5" idx="1"/>
+            <a:endCxn id="30" idx="1"/>
           </p:cNvCxnSpPr>
           <p:nvPr/>
         </p:nvCxnSpPr>
         <p:spPr>
           <a:xfrm rot="16200000" flipH="1">
-            <a:off x="1156620" y="951426"/>
-            <a:ext cx="988010" cy="897021"/>
+            <a:off x="858181" y="1249866"/>
+            <a:ext cx="1326407" cy="638538"/>
           </a:xfrm>
           <a:prstGeom prst="bentConnector2">
             <a:avLst/>
@@ -4503,15 +4508,16 @@
             </a:extLst>
           </p:cNvPr>
           <p:cNvCxnSpPr>
+            <a:cxnSpLocks/>
             <a:stCxn id="47" idx="2"/>
-            <a:endCxn id="5" idx="0"/>
+            <a:endCxn id="30" idx="0"/>
           </p:cNvCxnSpPr>
           <p:nvPr/>
         </p:nvCxnSpPr>
         <p:spPr>
           <a:xfrm rot="5400000">
-            <a:off x="4405314" y="362981"/>
-            <a:ext cx="700460" cy="1820599"/>
+            <a:off x="4097603" y="412208"/>
+            <a:ext cx="1057399" cy="2079082"/>
           </a:xfrm>
           <a:prstGeom prst="bentConnector3">
             <a:avLst/>
@@ -4591,8 +4597,8 @@
         </p:nvSpPr>
         <p:spPr>
           <a:xfrm>
-            <a:off x="6862638" y="4179455"/>
-            <a:ext cx="4812126" cy="2581563"/>
+            <a:off x="8016372" y="4986144"/>
+            <a:ext cx="3658391" cy="1774873"/>
           </a:xfrm>
           <a:prstGeom prst="roundRect">
             <a:avLst/>
@@ -4631,6 +4637,213 @@
           </a:p>
         </p:txBody>
       </p:sp>
+      <p:sp>
+        <p:nvSpPr>
+          <p:cNvPr id="30" name="Callout: Down Arrow 29">
+            <a:extLst>
+              <a:ext uri="{FF2B5EF4-FFF2-40B4-BE49-F238E27FC236}">
+                <a16:creationId xmlns:a16="http://schemas.microsoft.com/office/drawing/2014/main" id="{A2DB0892-78E2-4E17-AD2E-AB4179ED3B75}"/>
+              </a:ext>
+            </a:extLst>
+          </p:cNvPr>
+          <p:cNvSpPr/>
+          <p:nvPr/>
+        </p:nvSpPr>
+        <p:spPr>
+          <a:xfrm>
+            <a:off x="1840653" y="1980449"/>
+            <a:ext cx="3492216" cy="1103645"/>
+          </a:xfrm>
+          <a:prstGeom prst="downArrowCallout">
+            <a:avLst>
+              <a:gd name="adj1" fmla="val 10489"/>
+              <a:gd name="adj2" fmla="val 16526"/>
+              <a:gd name="adj3" fmla="val 25000"/>
+              <a:gd name="adj4" fmla="val 45647"/>
+            </a:avLst>
+          </a:prstGeom>
+        </p:spPr>
+        <p:style>
+          <a:lnRef idx="3">
+            <a:schemeClr val="lt1"/>
+          </a:lnRef>
+          <a:fillRef idx="1">
+            <a:schemeClr val="accent2"/>
+          </a:fillRef>
+          <a:effectRef idx="1">
+            <a:schemeClr val="accent2"/>
+          </a:effectRef>
+          <a:fontRef idx="minor">
+            <a:schemeClr val="lt1"/>
+          </a:fontRef>
+        </p:style>
+        <p:txBody>
+          <a:bodyPr rtlCol="0" anchor="ctr"/>
+          <a:lstStyle/>
+          <a:p>
+            <a:pPr algn="ctr"/>
+            <a:r>
+              <a:rPr lang="en-US" dirty="0"/>
+              <a:t>Event Grid</a:t>
+            </a:r>
+            <a:endParaRPr lang="en-AU" dirty="0"/>
+          </a:p>
+        </p:txBody>
+      </p:sp>
+      <p:sp>
+        <p:nvSpPr>
+          <p:cNvPr id="77" name="Rectangle: Diagonal Corners Snipped 76">
+            <a:extLst>
+              <a:ext uri="{FF2B5EF4-FFF2-40B4-BE49-F238E27FC236}">
+                <a16:creationId xmlns:a16="http://schemas.microsoft.com/office/drawing/2014/main" id="{70D74CE1-8F69-43E0-9EDE-2D32DA1DCC64}"/>
+              </a:ext>
+            </a:extLst>
+          </p:cNvPr>
+          <p:cNvSpPr/>
+          <p:nvPr/>
+        </p:nvSpPr>
+        <p:spPr>
+          <a:xfrm>
+            <a:off x="93261" y="3378458"/>
+            <a:ext cx="914400" cy="541571"/>
+          </a:xfrm>
+          <a:prstGeom prst="snip2DiagRect">
+            <a:avLst/>
+          </a:prstGeom>
+        </p:spPr>
+        <p:style>
+          <a:lnRef idx="1">
+            <a:schemeClr val="accent5"/>
+          </a:lnRef>
+          <a:fillRef idx="2">
+            <a:schemeClr val="accent5"/>
+          </a:fillRef>
+          <a:effectRef idx="1">
+            <a:schemeClr val="accent5"/>
+          </a:effectRef>
+          <a:fontRef idx="minor">
+            <a:schemeClr val="dk1"/>
+          </a:fontRef>
+        </p:style>
+        <p:txBody>
+          <a:bodyPr rtlCol="0" anchor="ctr"/>
+          <a:lstStyle/>
+          <a:p>
+            <a:pPr algn="ctr"/>
+            <a:r>
+              <a:rPr lang="en-US" dirty="0">
+                <a:solidFill>
+                  <a:schemeClr val="dk1"/>
+                </a:solidFill>
+              </a:rPr>
+              <a:t>Local Dev</a:t>
+            </a:r>
+            <a:endParaRPr lang="en-AU" dirty="0">
+              <a:solidFill>
+                <a:schemeClr val="dk1"/>
+              </a:solidFill>
+            </a:endParaRPr>
+          </a:p>
+        </p:txBody>
+      </p:sp>
+      <p:cxnSp>
+        <p:nvCxnSpPr>
+          <p:cNvPr id="78" name="Connector: Elbow 77">
+            <a:extLst>
+              <a:ext uri="{FF2B5EF4-FFF2-40B4-BE49-F238E27FC236}">
+                <a16:creationId xmlns:a16="http://schemas.microsoft.com/office/drawing/2014/main" id="{4DEEAFE6-0C0A-48A9-BA31-38787F9AC234}"/>
+              </a:ext>
+            </a:extLst>
+          </p:cNvPr>
+          <p:cNvCxnSpPr>
+            <a:cxnSpLocks/>
+            <a:stCxn id="77" idx="3"/>
+            <a:endCxn id="5" idx="1"/>
+          </p:cNvCxnSpPr>
+          <p:nvPr/>
+        </p:nvCxnSpPr>
+        <p:spPr>
+          <a:xfrm rot="5400000" flipH="1" flipV="1">
+            <a:off x="1152823" y="2690628"/>
+            <a:ext cx="85469" cy="1290193"/>
+          </a:xfrm>
+          <a:prstGeom prst="bentConnector2">
+            <a:avLst/>
+          </a:prstGeom>
+          <a:ln w="19050">
+            <a:solidFill>
+              <a:schemeClr val="accent1">
+                <a:lumMod val="60000"/>
+                <a:lumOff val="40000"/>
+              </a:schemeClr>
+            </a:solidFill>
+            <a:tailEnd type="triangle" w="lg" len="lg"/>
+          </a:ln>
+        </p:spPr>
+        <p:style>
+          <a:lnRef idx="1">
+            <a:schemeClr val="accent1"/>
+          </a:lnRef>
+          <a:fillRef idx="0">
+            <a:schemeClr val="accent1"/>
+          </a:fillRef>
+          <a:effectRef idx="0">
+            <a:schemeClr val="accent1"/>
+          </a:effectRef>
+          <a:fontRef idx="minor">
+            <a:schemeClr val="tx1"/>
+          </a:fontRef>
+        </p:style>
+      </p:cxnSp>
+      <p:cxnSp>
+        <p:nvCxnSpPr>
+          <p:cNvPr id="81" name="Connector: Elbow 80">
+            <a:extLst>
+              <a:ext uri="{FF2B5EF4-FFF2-40B4-BE49-F238E27FC236}">
+                <a16:creationId xmlns:a16="http://schemas.microsoft.com/office/drawing/2014/main" id="{35F95CE9-06B5-46C0-AEC6-9A3F420ABD31}"/>
+              </a:ext>
+            </a:extLst>
+          </p:cNvPr>
+          <p:cNvCxnSpPr>
+            <a:cxnSpLocks/>
+            <a:stCxn id="77" idx="1"/>
+            <a:endCxn id="6" idx="1"/>
+          </p:cNvCxnSpPr>
+          <p:nvPr/>
+        </p:nvCxnSpPr>
+        <p:spPr>
+          <a:xfrm rot="16200000" flipH="1">
+            <a:off x="1128546" y="3341944"/>
+            <a:ext cx="134023" cy="1290192"/>
+          </a:xfrm>
+          <a:prstGeom prst="bentConnector2">
+            <a:avLst/>
+          </a:prstGeom>
+          <a:ln w="19050">
+            <a:solidFill>
+              <a:schemeClr val="accent1">
+                <a:lumMod val="60000"/>
+                <a:lumOff val="40000"/>
+              </a:schemeClr>
+            </a:solidFill>
+            <a:tailEnd type="triangle" w="lg" len="lg"/>
+          </a:ln>
+        </p:spPr>
+        <p:style>
+          <a:lnRef idx="1">
+            <a:schemeClr val="accent1"/>
+          </a:lnRef>
+          <a:fillRef idx="0">
+            <a:schemeClr val="accent1"/>
+          </a:fillRef>
+          <a:effectRef idx="0">
+            <a:schemeClr val="accent1"/>
+          </a:effectRef>
+          <a:fontRef idx="minor">
+            <a:schemeClr val="tx1"/>
+          </a:fontRef>
+        </p:style>
+      </p:cxnSp>
     </p:spTree>
     <p:extLst>
       <p:ext uri="{BB962C8B-B14F-4D97-AF65-F5344CB8AC3E}">

</xml_diff>